<commit_message>
added overview slides for project
</commit_message>
<xml_diff>
--- a/Wi19_content/Project_Overview.pptx
+++ b/Wi19_content/Project_Overview.pptx
@@ -3991,10 +3991,6 @@
             </a:r>
             <a:r>
               <a:rPr lang="en-US" dirty="0" smtClean="0"/>
-              <a:t> </a:t>
-            </a:r>
-            <a:r>
-              <a:rPr lang="en-US" dirty="0" smtClean="0"/>
               <a:t>Tue</a:t>
             </a:r>
           </a:p>
@@ -4008,12 +4004,9 @@
             </a:r>
             <a:r>
               <a:rPr lang="en-US" dirty="0" smtClean="0"/>
-              <a:t>Team </a:t>
-            </a:r>
-            <a:r>
-              <a:rPr lang="en-US" dirty="0"/>
-              <a:t>pitches of basic idea </a:t>
-            </a:r>
+              <a:t>Finalize the teams and projects </a:t>
+            </a:r>
+            <a:endParaRPr lang="en-US" dirty="0"/>
           </a:p>
           <a:p>
             <a:pPr marL="0" indent="0">
@@ -4135,7 +4128,13 @@
               <a:rPr lang="en-US" altLang="en-US" dirty="0" smtClean="0">
                 <a:ea typeface="ＭＳ Ｐゴシック" charset="-128"/>
               </a:rPr>
-              <a:t>Draft rubric for 2018</a:t>
+              <a:t>Draft rubric for </a:t>
+            </a:r>
+            <a:r>
+              <a:rPr lang="en-US" altLang="en-US" dirty="0" smtClean="0">
+                <a:ea typeface="ＭＳ Ｐゴシック" charset="-128"/>
+              </a:rPr>
+              <a:t>2019</a:t>
             </a:r>
             <a:endParaRPr lang="en-US" altLang="en-US" dirty="0">
               <a:ea typeface="ＭＳ Ｐゴシック" charset="-128"/>
@@ -4295,7 +4294,7 @@
         </p:spPr>
         <p:txBody>
           <a:bodyPr>
-            <a:normAutofit fontScale="62500" lnSpcReduction="20000"/>
+            <a:normAutofit fontScale="70000" lnSpcReduction="20000"/>
           </a:bodyPr>
           <a:lstStyle/>
           <a:p>
@@ -4306,10 +4305,28 @@
               <a:t>Today:  </a:t>
             </a:r>
             <a:r>
+              <a:rPr lang="en-US" altLang="en-US" dirty="0" smtClean="0">
+                <a:ea typeface="ＭＳ Ｐゴシック" charset="-128"/>
+              </a:rPr>
+              <a:t>~</a:t>
+            </a:r>
+            <a:r>
+              <a:rPr lang="en-US" altLang="en-US" dirty="0" smtClean="0">
+                <a:ea typeface="ＭＳ Ｐゴシック" charset="-128"/>
+              </a:rPr>
+              <a:t>3</a:t>
+            </a:r>
+            <a:r>
+              <a:rPr lang="en-US" altLang="en-US" dirty="0" smtClean="0">
+                <a:ea typeface="ＭＳ Ｐゴシック" charset="-128"/>
+              </a:rPr>
+              <a:t>0 </a:t>
+            </a:r>
+            <a:r>
               <a:rPr lang="en-US" altLang="en-US" dirty="0">
                 <a:ea typeface="ＭＳ Ｐゴシック" charset="-128"/>
               </a:rPr>
-              <a:t>40 min of class </a:t>
+              <a:t>min of class </a:t>
             </a:r>
             <a:r>
               <a:rPr lang="en-US" altLang="en-US" dirty="0" smtClean="0">
@@ -4328,45 +4345,46 @@
             </a:endParaRPr>
           </a:p>
           <a:p>
+            <a:endParaRPr lang="en-US" altLang="en-US" dirty="0">
+              <a:ea typeface="ＭＳ Ｐゴシック" charset="-128"/>
+            </a:endParaRPr>
+          </a:p>
+          <a:p>
             <a:r>
               <a:rPr lang="en-US" altLang="en-US" dirty="0" smtClean="0">
                 <a:ea typeface="ＭＳ Ｐゴシック" charset="-128"/>
               </a:rPr>
-              <a:t>Rest of class</a:t>
+              <a:t>Later today</a:t>
+            </a:r>
+            <a:r>
+              <a:rPr lang="en-US" altLang="en-US" smtClean="0">
+                <a:ea typeface="ＭＳ Ｐゴシック" charset="-128"/>
+              </a:rPr>
+              <a:t>: </a:t>
+            </a:r>
+            <a:r>
+              <a:rPr lang="en-US" altLang="en-US" smtClean="0">
+                <a:ea typeface="ＭＳ Ｐゴシック" charset="-128"/>
+              </a:rPr>
+              <a:t>~</a:t>
+            </a:r>
+            <a:r>
+              <a:rPr lang="en-US" altLang="en-US" smtClean="0">
+                <a:ea typeface="ＭＳ Ｐゴシック" charset="-128"/>
+              </a:rPr>
+              <a:t>3</a:t>
+            </a:r>
+            <a:r>
+              <a:rPr lang="en-US" altLang="en-US" smtClean="0">
+                <a:ea typeface="ＭＳ Ｐゴシック" charset="-128"/>
+              </a:rPr>
+              <a:t>0 </a:t>
             </a:r>
             <a:r>
               <a:rPr lang="en-US" altLang="en-US" dirty="0">
                 <a:ea typeface="ＭＳ Ｐゴシック" charset="-128"/>
               </a:rPr>
-              <a:t>:</a:t>
-            </a:r>
-            <a:r>
-              <a:rPr lang="en-US" altLang="en-US" dirty="0" smtClean="0">
-                <a:ea typeface="ＭＳ Ｐゴシック" charset="-128"/>
-              </a:rPr>
-              <a:t> Distributions</a:t>
-            </a:r>
-            <a:endParaRPr lang="en-US" altLang="en-US" dirty="0">
-              <a:ea typeface="ＭＳ Ｐゴシック" charset="-128"/>
-            </a:endParaRPr>
-          </a:p>
-          <a:p>
-            <a:endParaRPr lang="en-US" altLang="en-US" dirty="0">
-              <a:ea typeface="ＭＳ Ｐゴシック" charset="-128"/>
-            </a:endParaRPr>
-          </a:p>
-          <a:p>
-            <a:r>
-              <a:rPr lang="en-US" altLang="en-US" dirty="0" smtClean="0">
-                <a:ea typeface="ＭＳ Ｐゴシック" charset="-128"/>
-              </a:rPr>
-              <a:t>Later today: </a:t>
-            </a:r>
-            <a:r>
-              <a:rPr lang="en-US" altLang="en-US" dirty="0">
-                <a:ea typeface="ＭＳ Ｐゴシック" charset="-128"/>
-              </a:rPr>
-              <a:t>40 min of class </a:t>
+              <a:t>min of class </a:t>
             </a:r>
             <a:r>
               <a:rPr lang="en-US" altLang="en-US" dirty="0" smtClean="0">
@@ -4378,19 +4396,29 @@
               <a:rPr lang="en-US" altLang="en-US" dirty="0">
                 <a:ea typeface="ＭＳ Ｐゴシック" charset="-128"/>
               </a:rPr>
-              <a:t>for enterprising students to “pitch” ideas and recruit team members. We especially </a:t>
-            </a:r>
+              <a:t>for enterprising students to “pitch” ideas and recruit team members. </a:t>
+            </a:r>
+            <a:endParaRPr lang="en-US" altLang="en-US" dirty="0" smtClean="0">
+              <a:ea typeface="ＭＳ Ｐゴシック" charset="-128"/>
+            </a:endParaRPr>
+          </a:p>
+          <a:p>
+            <a:endParaRPr lang="en-US" altLang="en-US" dirty="0" smtClean="0">
+              <a:ea typeface="ＭＳ Ｐゴシック" charset="-128"/>
+            </a:endParaRPr>
+          </a:p>
+          <a:p>
             <a:r>
               <a:rPr lang="en-US" altLang="en-US" dirty="0" smtClean="0">
                 <a:ea typeface="ＭＳ Ｐゴシック" charset="-128"/>
               </a:rPr>
-              <a:t>want ESL </a:t>
+              <a:t>Students </a:t>
             </a:r>
             <a:r>
               <a:rPr lang="en-US" altLang="en-US" dirty="0">
                 <a:ea typeface="ＭＳ Ｐゴシック" charset="-128"/>
               </a:rPr>
-              <a:t>students to participate and note we recognize their skills / abilities even if they are still new at English – great opportunity to practice and get feedback! Students will contribute to a Google Sheet if they like a project and want to sign up. </a:t>
+              <a:t>will contribute to a Google Sheet if they like a project and want to sign up. </a:t>
             </a:r>
             <a:r>
               <a:rPr lang="en-US" altLang="en-US" dirty="0" smtClean="0">
@@ -4400,45 +4428,22 @@
             </a:r>
           </a:p>
           <a:p>
+            <a:endParaRPr lang="en-US" altLang="en-US" dirty="0">
+              <a:ea typeface="ＭＳ Ｐゴシック" charset="-128"/>
+            </a:endParaRPr>
+          </a:p>
+          <a:p>
             <a:r>
               <a:rPr lang="en-US" altLang="en-US" dirty="0" smtClean="0">
                 <a:ea typeface="ＭＳ Ｐゴシック" charset="-128"/>
               </a:rPr>
-              <a:t>Rest of class: Distributions + K nearest neighbor</a:t>
-            </a:r>
-            <a:endParaRPr lang="en-US" altLang="en-US" dirty="0">
-              <a:ea typeface="ＭＳ Ｐゴシック" charset="-128"/>
-            </a:endParaRPr>
-          </a:p>
-          <a:p>
-            <a:endParaRPr lang="en-US" altLang="en-US" dirty="0">
-              <a:ea typeface="ＭＳ Ｐゴシック" charset="-128"/>
-            </a:endParaRPr>
-          </a:p>
-          <a:p>
-            <a:r>
-              <a:rPr lang="en-US" altLang="en-US" dirty="0" smtClean="0">
-                <a:ea typeface="ＭＳ Ｐゴシック" charset="-128"/>
-              </a:rPr>
-              <a:t>Thu: </a:t>
+              <a:t>Tue: Teams </a:t>
             </a:r>
             <a:r>
               <a:rPr lang="en-US" altLang="en-US" dirty="0">
                 <a:ea typeface="ＭＳ Ｐゴシック" charset="-128"/>
               </a:rPr>
-              <a:t>40 min of class </a:t>
-            </a:r>
-            <a:r>
-              <a:rPr lang="en-US" altLang="en-US" dirty="0" smtClean="0">
-                <a:ea typeface="ＭＳ Ｐゴシック" charset="-128"/>
-              </a:rPr>
-              <a:t>time. </a:t>
-            </a:r>
-            <a:r>
-              <a:rPr lang="en-US" altLang="en-US" dirty="0">
-                <a:ea typeface="ＭＳ Ｐゴシック" charset="-128"/>
-              </a:rPr>
-              <a:t>Teams have to pitch ideas to </a:t>
+              <a:t>have to pitch ideas to </a:t>
             </a:r>
             <a:r>
               <a:rPr lang="en-US" altLang="en-US" dirty="0" smtClean="0">
@@ -4458,21 +4463,7 @@
               </a:rPr>
               <a:t>.</a:t>
             </a:r>
-          </a:p>
-          <a:p>
-            <a:r>
-              <a:rPr lang="en-US" altLang="en-US" dirty="0" smtClean="0">
-                <a:ea typeface="ＭＳ Ｐゴシック" charset="-128"/>
-              </a:rPr>
-              <a:t>Rest of class: K nearest neighbor, </a:t>
-            </a:r>
-            <a:r>
-              <a:rPr lang="en-US" altLang="en-US" smtClean="0">
-                <a:ea typeface="ＭＳ Ｐゴシック" charset="-128"/>
-              </a:rPr>
-              <a:t>version control II</a:t>
-            </a:r>
-            <a:endParaRPr lang="en-US" altLang="en-US" dirty="0">
+            <a:endParaRPr lang="en-US" altLang="en-US" dirty="0" smtClean="0">
               <a:ea typeface="ＭＳ Ｐゴシック" charset="-128"/>
             </a:endParaRPr>
           </a:p>

</xml_diff>